<commit_message>
Update RMD For Total Mean Degree and Plotting
</commit_message>
<xml_diff>
--- a/Analysis/Mean Degree Method Comparison/Manuscript/Presentation.pptx
+++ b/Analysis/Mean Degree Method Comparison/Manuscript/Presentation.pptx
@@ -17,6 +17,7 @@
     <p:sldId id="273" r:id="rId11"/>
     <p:sldId id="272" r:id="rId12"/>
     <p:sldId id="274" r:id="rId13"/>
+    <p:sldId id="275" r:id="rId14"/>
   </p:sldIdLst>
   <p:sldSz cx="12192000" cy="6858000"/>
   <p:notesSz cx="6858000" cy="9144000"/>
@@ -270,7 +271,7 @@
           <a:p>
             <a:fld id="{E93050EF-3069-41E3-A8B3-366C52D983D8}" type="datetimeFigureOut">
               <a:rPr lang="en-US" smtClean="0"/>
-              <a:t>2/17/2020</a:t>
+              <a:t>2/24/2020</a:t>
             </a:fld>
             <a:endParaRPr lang="en-US"/>
           </a:p>
@@ -468,7 +469,7 @@
           <a:p>
             <a:fld id="{E93050EF-3069-41E3-A8B3-366C52D983D8}" type="datetimeFigureOut">
               <a:rPr lang="en-US" smtClean="0"/>
-              <a:t>2/17/2020</a:t>
+              <a:t>2/24/2020</a:t>
             </a:fld>
             <a:endParaRPr lang="en-US"/>
           </a:p>
@@ -676,7 +677,7 @@
           <a:p>
             <a:fld id="{E93050EF-3069-41E3-A8B3-366C52D983D8}" type="datetimeFigureOut">
               <a:rPr lang="en-US" smtClean="0"/>
-              <a:t>2/17/2020</a:t>
+              <a:t>2/24/2020</a:t>
             </a:fld>
             <a:endParaRPr lang="en-US"/>
           </a:p>
@@ -874,7 +875,7 @@
           <a:p>
             <a:fld id="{E93050EF-3069-41E3-A8B3-366C52D983D8}" type="datetimeFigureOut">
               <a:rPr lang="en-US" smtClean="0"/>
-              <a:t>2/17/2020</a:t>
+              <a:t>2/24/2020</a:t>
             </a:fld>
             <a:endParaRPr lang="en-US"/>
           </a:p>
@@ -1149,7 +1150,7 @@
           <a:p>
             <a:fld id="{E93050EF-3069-41E3-A8B3-366C52D983D8}" type="datetimeFigureOut">
               <a:rPr lang="en-US" smtClean="0"/>
-              <a:t>2/17/2020</a:t>
+              <a:t>2/24/2020</a:t>
             </a:fld>
             <a:endParaRPr lang="en-US"/>
           </a:p>
@@ -1414,7 +1415,7 @@
           <a:p>
             <a:fld id="{E93050EF-3069-41E3-A8B3-366C52D983D8}" type="datetimeFigureOut">
               <a:rPr lang="en-US" smtClean="0"/>
-              <a:t>2/17/2020</a:t>
+              <a:t>2/24/2020</a:t>
             </a:fld>
             <a:endParaRPr lang="en-US"/>
           </a:p>
@@ -1826,7 +1827,7 @@
           <a:p>
             <a:fld id="{E93050EF-3069-41E3-A8B3-366C52D983D8}" type="datetimeFigureOut">
               <a:rPr lang="en-US" smtClean="0"/>
-              <a:t>2/17/2020</a:t>
+              <a:t>2/24/2020</a:t>
             </a:fld>
             <a:endParaRPr lang="en-US"/>
           </a:p>
@@ -1967,7 +1968,7 @@
           <a:p>
             <a:fld id="{E93050EF-3069-41E3-A8B3-366C52D983D8}" type="datetimeFigureOut">
               <a:rPr lang="en-US" smtClean="0"/>
-              <a:t>2/17/2020</a:t>
+              <a:t>2/24/2020</a:t>
             </a:fld>
             <a:endParaRPr lang="en-US"/>
           </a:p>
@@ -2080,7 +2081,7 @@
           <a:p>
             <a:fld id="{E93050EF-3069-41E3-A8B3-366C52D983D8}" type="datetimeFigureOut">
               <a:rPr lang="en-US" smtClean="0"/>
-              <a:t>2/17/2020</a:t>
+              <a:t>2/24/2020</a:t>
             </a:fld>
             <a:endParaRPr lang="en-US"/>
           </a:p>
@@ -2391,7 +2392,7 @@
           <a:p>
             <a:fld id="{E93050EF-3069-41E3-A8B3-366C52D983D8}" type="datetimeFigureOut">
               <a:rPr lang="en-US" smtClean="0"/>
-              <a:t>2/17/2020</a:t>
+              <a:t>2/24/2020</a:t>
             </a:fld>
             <a:endParaRPr lang="en-US"/>
           </a:p>
@@ -2679,7 +2680,7 @@
           <a:p>
             <a:fld id="{E93050EF-3069-41E3-A8B3-366C52D983D8}" type="datetimeFigureOut">
               <a:rPr lang="en-US" smtClean="0"/>
-              <a:t>2/17/2020</a:t>
+              <a:t>2/24/2020</a:t>
             </a:fld>
             <a:endParaRPr lang="en-US"/>
           </a:p>
@@ -2920,7 +2921,7 @@
           <a:p>
             <a:fld id="{E93050EF-3069-41E3-A8B3-366C52D983D8}" type="datetimeFigureOut">
               <a:rPr lang="en-US" smtClean="0"/>
-              <a:t>2/17/2020</a:t>
+              <a:t>2/24/2020</a:t>
             </a:fld>
             <a:endParaRPr lang="en-US"/>
           </a:p>
@@ -3603,6 +3604,181 @@
     <p:extLst>
       <p:ext uri="{BB962C8B-B14F-4D97-AF65-F5344CB8AC3E}">
         <p14:creationId xmlns:p14="http://schemas.microsoft.com/office/powerpoint/2010/main" val="4060262622"/>
+      </p:ext>
+    </p:extLst>
+  </p:cSld>
+  <p:clrMapOvr>
+    <a:masterClrMapping/>
+  </p:clrMapOvr>
+</p:sld>
+</file>
+
+<file path=ppt/slides/slide13.xml><?xml version="1.0" encoding="utf-8"?>
+<p:sld xmlns:a="http://schemas.openxmlformats.org/drawingml/2006/main" xmlns:r="http://schemas.openxmlformats.org/officeDocument/2006/relationships" xmlns:p="http://schemas.openxmlformats.org/presentationml/2006/main">
+  <p:cSld>
+    <p:spTree>
+      <p:nvGrpSpPr>
+        <p:cNvPr id="1" name=""/>
+        <p:cNvGrpSpPr/>
+        <p:nvPr/>
+      </p:nvGrpSpPr>
+      <p:grpSpPr>
+        <a:xfrm>
+          <a:off x="0" y="0"/>
+          <a:ext cx="0" cy="0"/>
+          <a:chOff x="0" y="0"/>
+          <a:chExt cx="0" cy="0"/>
+        </a:xfrm>
+      </p:grpSpPr>
+      <p:sp>
+        <p:nvSpPr>
+          <p:cNvPr id="2" name="Title 1">
+            <a:extLst>
+              <a:ext uri="{FF2B5EF4-FFF2-40B4-BE49-F238E27FC236}">
+                <a16:creationId xmlns:a16="http://schemas.microsoft.com/office/drawing/2014/main" id="{139D5FAE-8E44-437B-BA53-31382E63D06A}"/>
+              </a:ext>
+            </a:extLst>
+          </p:cNvPr>
+          <p:cNvSpPr>
+            <a:spLocks noGrp="1"/>
+          </p:cNvSpPr>
+          <p:nvPr>
+            <p:ph type="title"/>
+          </p:nvPr>
+        </p:nvSpPr>
+        <p:spPr/>
+        <p:txBody>
+          <a:bodyPr/>
+          <a:lstStyle/>
+          <a:p>
+            <a:r>
+              <a:rPr lang="en-US" dirty="0"/>
+              <a:t>Paper Outline</a:t>
+            </a:r>
+          </a:p>
+        </p:txBody>
+      </p:sp>
+      <p:sp>
+        <p:nvSpPr>
+          <p:cNvPr id="3" name="Content Placeholder 2">
+            <a:extLst>
+              <a:ext uri="{FF2B5EF4-FFF2-40B4-BE49-F238E27FC236}">
+                <a16:creationId xmlns:a16="http://schemas.microsoft.com/office/drawing/2014/main" id="{105656AB-067C-424C-A1CE-D64BA10416B8}"/>
+              </a:ext>
+            </a:extLst>
+          </p:cNvPr>
+          <p:cNvSpPr>
+            <a:spLocks noGrp="1"/>
+          </p:cNvSpPr>
+          <p:nvPr>
+            <p:ph idx="1"/>
+          </p:nvPr>
+        </p:nvSpPr>
+        <p:spPr/>
+        <p:txBody>
+          <a:bodyPr>
+            <a:normAutofit fontScale="92500" lnSpcReduction="20000"/>
+          </a:bodyPr>
+          <a:lstStyle/>
+          <a:p>
+            <a:pPr marL="514350" indent="-514350">
+              <a:buFont typeface="+mj-lt"/>
+              <a:buAutoNum type="arabicPeriod"/>
+            </a:pPr>
+            <a:r>
+              <a:rPr lang="en-US" dirty="0"/>
+              <a:t>Introduce partnership concurrency as it pertains to sexual networks</a:t>
+            </a:r>
+          </a:p>
+          <a:p>
+            <a:pPr marL="514350" indent="-514350">
+              <a:buFont typeface="+mj-lt"/>
+              <a:buAutoNum type="arabicPeriod"/>
+            </a:pPr>
+            <a:r>
+              <a:rPr lang="en-US" dirty="0"/>
+              <a:t>Introduce two methods for determining degree of partnership concurrency, along with strengths and weaknesses of both methods</a:t>
+            </a:r>
+          </a:p>
+          <a:p>
+            <a:pPr marL="514350" indent="-514350">
+              <a:buFont typeface="+mj-lt"/>
+              <a:buAutoNum type="arabicPeriod"/>
+            </a:pPr>
+            <a:r>
+              <a:rPr lang="en-US" dirty="0"/>
+              <a:t>Apply these two methods to </a:t>
+            </a:r>
+            <a:r>
+              <a:rPr lang="en-US" dirty="0" err="1"/>
+              <a:t>ARTnet</a:t>
+            </a:r>
+            <a:r>
+              <a:rPr lang="en-US" dirty="0"/>
+              <a:t> – discuss crude analysis results</a:t>
+            </a:r>
+          </a:p>
+          <a:p>
+            <a:pPr marL="514350" indent="-514350">
+              <a:buFont typeface="+mj-lt"/>
+              <a:buAutoNum type="arabicPeriod"/>
+            </a:pPr>
+            <a:r>
+              <a:rPr lang="en-US" dirty="0"/>
+              <a:t>Investigate mechanisms for discrepancies and discuss findings of which mechanisms, in the </a:t>
+            </a:r>
+            <a:r>
+              <a:rPr lang="en-US" dirty="0" err="1"/>
+              <a:t>ARTnet</a:t>
+            </a:r>
+            <a:r>
+              <a:rPr lang="en-US" dirty="0"/>
+              <a:t> comparison, were suggested to be driving the difference in results</a:t>
+            </a:r>
+          </a:p>
+          <a:p>
+            <a:pPr marL="514350" indent="-514350">
+              <a:buFont typeface="+mj-lt"/>
+              <a:buAutoNum type="arabicPeriod"/>
+            </a:pPr>
+            <a:r>
+              <a:rPr lang="en-US" dirty="0"/>
+              <a:t>Implications - Sensitivity analysis for how incidence/prevalence differs depending on which method is used?</a:t>
+            </a:r>
+          </a:p>
+          <a:p>
+            <a:pPr marL="514350" indent="-514350">
+              <a:buFont typeface="+mj-lt"/>
+              <a:buAutoNum type="arabicPeriod"/>
+            </a:pPr>
+            <a:r>
+              <a:rPr lang="en-US" dirty="0"/>
+              <a:t>Conclusions about importance of consideration for methods used to derive partnership concurrency parameters, possible strengths and limitations with using each method, and mechanisms for which bias may impact parameter estimation</a:t>
+            </a:r>
+          </a:p>
+          <a:p>
+            <a:pPr marL="514350" indent="-514350">
+              <a:buFont typeface="+mj-lt"/>
+              <a:buAutoNum type="arabicPeriod"/>
+            </a:pPr>
+            <a:endParaRPr lang="en-US" dirty="0"/>
+          </a:p>
+          <a:p>
+            <a:pPr marL="514350" indent="-514350">
+              <a:buFont typeface="+mj-lt"/>
+              <a:buAutoNum type="arabicPeriod"/>
+            </a:pPr>
+            <a:endParaRPr lang="en-US" dirty="0"/>
+          </a:p>
+          <a:p>
+            <a:endParaRPr lang="en-US" dirty="0"/>
+          </a:p>
+        </p:txBody>
+      </p:sp>
+    </p:spTree>
+    <p:extLst>
+      <p:ext uri="{BB962C8B-B14F-4D97-AF65-F5344CB8AC3E}">
+        <p14:creationId xmlns:p14="http://schemas.microsoft.com/office/powerpoint/2010/main" val="390427466"/>
       </p:ext>
     </p:extLst>
   </p:cSld>

</xml_diff>